<commit_message>
A little bit of image polish
</commit_message>
<xml_diff>
--- a/ideas/just-start/just-start.pptx
+++ b/ideas/just-start/just-start.pptx
@@ -151,11 +151,11 @@
           <c:order val="0"/>
           <c:tx>
             <c:strRef>
-              <c:f>Sheet1!$A$1</c:f>
+              <c:f>Sheet1!$D$1</c:f>
               <c:strCache>
                 <c:ptCount val="1"/>
                 <c:pt idx="0">
-                  <c:v>Impact</c:v>
+                  <c:v>Learning</c:v>
                 </c:pt>
               </c:strCache>
             </c:strRef>
@@ -196,84 +196,84 @@
           </c:spPr>
           <c:val>
             <c:numRef>
-              <c:f>Sheet1!$A$2:$A$26</c:f>
+              <c:f>Sheet1!$D$2:$D$26</c:f>
               <c:numCache>
                 <c:formatCode>General</c:formatCode>
                 <c:ptCount val="25"/>
                 <c:pt idx="0">
-                  <c:v>13</c:v>
+                  <c:v>1</c:v>
                 </c:pt>
                 <c:pt idx="1">
-                  <c:v>13</c:v>
+                  <c:v>1</c:v>
                 </c:pt>
                 <c:pt idx="2">
-                  <c:v>13</c:v>
+                  <c:v>12</c:v>
                 </c:pt>
                 <c:pt idx="3">
-                  <c:v>13</c:v>
+                  <c:v>25</c:v>
                 </c:pt>
                 <c:pt idx="4">
-                  <c:v>13</c:v>
+                  <c:v>32</c:v>
                 </c:pt>
                 <c:pt idx="5">
-                  <c:v>15</c:v>
+                  <c:v>35</c:v>
                 </c:pt>
                 <c:pt idx="6">
-                  <c:v>15</c:v>
+                  <c:v>35</c:v>
                 </c:pt>
                 <c:pt idx="7">
-                  <c:v>15</c:v>
+                  <c:v>38</c:v>
                 </c:pt>
                 <c:pt idx="8">
-                  <c:v>15</c:v>
+                  <c:v>38</c:v>
                 </c:pt>
                 <c:pt idx="9">
-                  <c:v>15</c:v>
+                  <c:v>39</c:v>
                 </c:pt>
                 <c:pt idx="10">
-                  <c:v>16</c:v>
+                  <c:v>40</c:v>
                 </c:pt>
                 <c:pt idx="11">
-                  <c:v>17</c:v>
+                  <c:v>42</c:v>
                 </c:pt>
                 <c:pt idx="12">
-                  <c:v>19</c:v>
+                  <c:v>45</c:v>
                 </c:pt>
                 <c:pt idx="13">
-                  <c:v>19</c:v>
+                  <c:v>45</c:v>
                 </c:pt>
                 <c:pt idx="14">
-                  <c:v>19</c:v>
+                  <c:v>45</c:v>
                 </c:pt>
                 <c:pt idx="15">
-                  <c:v>23</c:v>
+                  <c:v>45</c:v>
                 </c:pt>
                 <c:pt idx="16">
-                  <c:v>25</c:v>
+                  <c:v>46</c:v>
                 </c:pt>
                 <c:pt idx="17">
-                  <c:v>25</c:v>
+                  <c:v>47</c:v>
                 </c:pt>
                 <c:pt idx="18">
-                  <c:v>25</c:v>
+                  <c:v>48</c:v>
                 </c:pt>
                 <c:pt idx="19">
-                  <c:v>27</c:v>
+                  <c:v>49</c:v>
                 </c:pt>
                 <c:pt idx="20">
-                  <c:v>28</c:v>
+                  <c:v>50</c:v>
                 </c:pt>
                 <c:pt idx="21">
-                  <c:v>29</c:v>
+                  <c:v>50</c:v>
                 </c:pt>
                 <c:pt idx="22">
-                  <c:v>30</c:v>
+                  <c:v>50</c:v>
                 </c:pt>
                 <c:pt idx="23">
-                  <c:v>30</c:v>
+                  <c:v>56</c:v>
                 </c:pt>
                 <c:pt idx="24">
-                  <c:v>30</c:v>
+                  <c:v>59</c:v>
                 </c:pt>
               </c:numCache>
             </c:numRef>
@@ -289,11 +289,11 @@
           <c:order val="1"/>
           <c:tx>
             <c:strRef>
-              <c:f>Sheet1!$B$1</c:f>
+              <c:f>Sheet1!$E$1</c:f>
               <c:strCache>
                 <c:ptCount val="1"/>
                 <c:pt idx="0">
-                  <c:v>Learning</c:v>
+                  <c:v>Impact</c:v>
                 </c:pt>
               </c:strCache>
             </c:strRef>
@@ -327,91 +327,91 @@
               </a:path>
               <a:tileRect/>
             </a:gradFill>
-            <a:ln>
+            <a:ln w="25400">
               <a:noFill/>
             </a:ln>
             <a:effectLst/>
           </c:spPr>
           <c:val>
             <c:numRef>
-              <c:f>Sheet1!$B$2:$B$26</c:f>
+              <c:f>Sheet1!$E$2:$E$26</c:f>
               <c:numCache>
                 <c:formatCode>General</c:formatCode>
                 <c:ptCount val="25"/>
                 <c:pt idx="0">
+                  <c:v>0</c:v>
+                </c:pt>
+                <c:pt idx="1">
+                  <c:v>0</c:v>
+                </c:pt>
+                <c:pt idx="2">
+                  <c:v>5</c:v>
+                </c:pt>
+                <c:pt idx="3">
+                  <c:v>7</c:v>
+                </c:pt>
+                <c:pt idx="4">
+                  <c:v>7</c:v>
+                </c:pt>
+                <c:pt idx="5">
+                  <c:v>5</c:v>
+                </c:pt>
+                <c:pt idx="6">
+                  <c:v>4</c:v>
+                </c:pt>
+                <c:pt idx="7">
                   <c:v>2</c:v>
-                </c:pt>
-                <c:pt idx="1">
-                  <c:v>3</c:v>
-                </c:pt>
-                <c:pt idx="2">
-                  <c:v>2</c:v>
-                </c:pt>
-                <c:pt idx="3">
-                  <c:v>5</c:v>
-                </c:pt>
-                <c:pt idx="4">
-                  <c:v>5</c:v>
-                </c:pt>
-                <c:pt idx="5">
-                  <c:v>2</c:v>
-                </c:pt>
-                <c:pt idx="6">
-                  <c:v>2</c:v>
-                </c:pt>
-                <c:pt idx="7">
-                  <c:v>4</c:v>
                 </c:pt>
                 <c:pt idx="8">
                   <c:v>3</c:v>
                 </c:pt>
                 <c:pt idx="9">
-                  <c:v>2</c:v>
+                  <c:v>3</c:v>
                 </c:pt>
                 <c:pt idx="10">
                   <c:v>5</c:v>
                 </c:pt>
                 <c:pt idx="11">
-                  <c:v>2</c:v>
+                  <c:v>3</c:v>
                 </c:pt>
                 <c:pt idx="12">
+                  <c:v>4</c:v>
+                </c:pt>
+                <c:pt idx="13">
+                  <c:v>5</c:v>
+                </c:pt>
+                <c:pt idx="14">
                   <c:v>6</c:v>
                 </c:pt>
-                <c:pt idx="13">
-                  <c:v>2</c:v>
-                </c:pt>
-                <c:pt idx="14">
-                  <c:v>2</c:v>
-                </c:pt>
                 <c:pt idx="15">
+                  <c:v>9</c:v>
+                </c:pt>
+                <c:pt idx="16">
+                  <c:v>8</c:v>
+                </c:pt>
+                <c:pt idx="17">
+                  <c:v>5</c:v>
+                </c:pt>
+                <c:pt idx="18">
+                  <c:v>9</c:v>
+                </c:pt>
+                <c:pt idx="19">
                   <c:v>3</c:v>
                 </c:pt>
-                <c:pt idx="16">
-                  <c:v>4</c:v>
-                </c:pt>
-                <c:pt idx="17">
-                  <c:v>2</c:v>
-                </c:pt>
-                <c:pt idx="18">
+                <c:pt idx="20">
                   <c:v>5</c:v>
                 </c:pt>
-                <c:pt idx="19">
-                  <c:v>4</c:v>
-                </c:pt>
-                <c:pt idx="20">
-                  <c:v>3</c:v>
-                </c:pt>
                 <c:pt idx="21">
-                  <c:v>2</c:v>
+                  <c:v>7</c:v>
                 </c:pt>
                 <c:pt idx="22">
-                  <c:v>4</c:v>
+                  <c:v>9</c:v>
                 </c:pt>
                 <c:pt idx="23">
-                  <c:v>2</c:v>
+                  <c:v>9</c:v>
                 </c:pt>
                 <c:pt idx="24">
-                  <c:v>3</c:v>
+                  <c:v>10</c:v>
                 </c:pt>
               </c:numCache>
             </c:numRef>
@@ -4861,6 +4861,21 @@
 <file path=ppt/slides/slide1.xml><?xml version="1.0" encoding="utf-8"?>
 <p:sld xmlns:a="http://schemas.openxmlformats.org/drawingml/2006/main" xmlns:r="http://schemas.openxmlformats.org/officeDocument/2006/relationships" xmlns:p="http://schemas.openxmlformats.org/presentationml/2006/main">
   <p:cSld>
+    <p:bg>
+      <p:bgPr>
+        <a:pattFill prst="dotGrid">
+          <a:fgClr>
+            <a:schemeClr val="bg1">
+              <a:lumMod val="95000"/>
+            </a:schemeClr>
+          </a:fgClr>
+          <a:bgClr>
+            <a:schemeClr val="bg1"/>
+          </a:bgClr>
+        </a:pattFill>
+        <a:effectLst/>
+      </p:bgPr>
+    </p:bg>
     <p:spTree>
       <p:nvGrpSpPr>
         <p:cNvPr id="1" name=""/>
@@ -4888,7 +4903,7 @@
           <p:nvPr>
             <p:extLst>
               <p:ext uri="{D42A27DB-BD31-4B8C-83A1-F6EECF244321}">
-                <p14:modId xmlns:p14="http://schemas.microsoft.com/office/powerpoint/2010/main" val="3338711499"/>
+                <p14:modId xmlns:p14="http://schemas.microsoft.com/office/powerpoint/2010/main" val="3078916157"/>
               </p:ext>
             </p:extLst>
           </p:nvPr>
@@ -5436,13 +5451,14 @@
           </p:cNvPr>
           <p:cNvCxnSpPr>
             <a:cxnSpLocks/>
+            <a:endCxn id="69" idx="1"/>
           </p:cNvCxnSpPr>
           <p:nvPr/>
         </p:nvCxnSpPr>
         <p:spPr>
           <a:xfrm flipV="1">
-            <a:off x="245378" y="3212086"/>
-            <a:ext cx="8599188" cy="267099"/>
+            <a:off x="245378" y="3377841"/>
+            <a:ext cx="3976838" cy="101346"/>
           </a:xfrm>
           <a:prstGeom prst="line">
             <a:avLst/>
@@ -5487,9 +5503,7 @@
           <a:prstGeom prst="rect">
             <a:avLst/>
           </a:prstGeom>
-          <a:solidFill>
-            <a:schemeClr val="bg1"/>
-          </a:solidFill>
+          <a:noFill/>
         </p:spPr>
         <p:txBody>
           <a:bodyPr wrap="square" rtlCol="0">
@@ -5527,9 +5541,7 @@
           <a:prstGeom prst="rect">
             <a:avLst/>
           </a:prstGeom>
-          <a:solidFill>
-            <a:schemeClr val="bg1"/>
-          </a:solidFill>
+          <a:noFill/>
           <a:ln>
             <a:noFill/>
           </a:ln>
@@ -5588,9 +5600,7 @@
           <a:prstGeom prst="rect">
             <a:avLst/>
           </a:prstGeom>
-          <a:solidFill>
-            <a:schemeClr val="bg1"/>
-          </a:solidFill>
+          <a:noFill/>
           <a:ln>
             <a:noFill/>
           </a:ln>
@@ -6384,7 +6394,7 @@
         </p:blipFill>
         <p:spPr bwMode="auto">
           <a:xfrm>
-            <a:off x="174141" y="5519014"/>
+            <a:off x="174141" y="6215301"/>
             <a:ext cx="640662" cy="567566"/>
           </a:xfrm>
           <a:prstGeom prst="rect">
@@ -6402,6 +6412,49 @@
           </a:extLst>
         </p:spPr>
       </p:pic>
+      <p:cxnSp>
+        <p:nvCxnSpPr>
+          <p:cNvPr id="27" name="Straight Connector 26">
+            <a:extLst>
+              <a:ext uri="{FF2B5EF4-FFF2-40B4-BE49-F238E27FC236}">
+                <a16:creationId xmlns:a16="http://schemas.microsoft.com/office/drawing/2014/main" id="{746E7D03-2D93-4946-A986-B477E4A9E5E0}"/>
+              </a:ext>
+            </a:extLst>
+          </p:cNvPr>
+          <p:cNvCxnSpPr>
+            <a:cxnSpLocks/>
+            <a:stCxn id="69" idx="3"/>
+          </p:cNvCxnSpPr>
+          <p:nvPr/>
+        </p:nvCxnSpPr>
+        <p:spPr>
+          <a:xfrm flipV="1">
+            <a:off x="4982652" y="3261711"/>
+            <a:ext cx="3888191" cy="102856"/>
+          </a:xfrm>
+          <a:prstGeom prst="line">
+            <a:avLst/>
+          </a:prstGeom>
+          <a:ln w="28575">
+            <a:headEnd type="none" w="med" len="med"/>
+            <a:tailEnd type="none" w="med" len="med"/>
+          </a:ln>
+        </p:spPr>
+        <p:style>
+          <a:lnRef idx="1">
+            <a:schemeClr val="dk1"/>
+          </a:lnRef>
+          <a:fillRef idx="0">
+            <a:schemeClr val="dk1"/>
+          </a:fillRef>
+          <a:effectRef idx="0">
+            <a:schemeClr val="dk1"/>
+          </a:effectRef>
+          <a:fontRef idx="minor">
+            <a:schemeClr val="tx1"/>
+          </a:fontRef>
+        </p:style>
+      </p:cxnSp>
     </p:spTree>
     <p:extLst>
       <p:ext uri="{BB962C8B-B14F-4D97-AF65-F5344CB8AC3E}">

</xml_diff>